<commit_message>
Update Slide Đồ án tốt nghiệp_Nguyễn Tuấn Anh_REV3.pptx
</commit_message>
<xml_diff>
--- a/documents/Slide Đồ án tốt nghiệp_Nguyễn Tuấn Anh_REV3.pptx
+++ b/documents/Slide Đồ án tốt nghiệp_Nguyễn Tuấn Anh_REV3.pptx
@@ -256,7 +256,7 @@
           <a:p>
             <a:fld id="{C8EC4C12-44DC-4AF1-91BC-D6BFF5E34312}" type="datetimeFigureOut">
               <a:rPr lang="vi-VN" smtClean="0"/>
-              <a:t>29/01/2021</a:t>
+              <a:t>30/01/2021</a:t>
             </a:fld>
             <a:endParaRPr lang="vi-VN"/>
           </a:p>
@@ -4874,11 +4874,11 @@
               <a:buNone/>
             </a:pPr>
             <a:r>
-              <a:rPr lang="en-US" dirty="0">
+              <a:rPr lang="en-US">
                 <a:latin typeface="Times New Roman" panose="02020603050405020304" pitchFamily="18" charset="0"/>
                 <a:cs typeface="Times New Roman" panose="02020603050405020304" pitchFamily="18" charset="0"/>
               </a:rPr>
-              <a:t>8</a:t>
+              <a:t>7</a:t>
             </a:r>
             <a:endParaRPr lang="vi-VN" dirty="0">
               <a:latin typeface="Times New Roman" panose="02020603050405020304" pitchFamily="18" charset="0"/>
@@ -9971,10 +9971,10 @@
       </p:sp>
       <p:pic>
         <p:nvPicPr>
-          <p:cNvPr id="8" name="Picture 7">
+          <p:cNvPr id="3" name="Picture 2">
             <a:extLst>
               <a:ext uri="{FF2B5EF4-FFF2-40B4-BE49-F238E27FC236}">
-                <a16:creationId xmlns:a16="http://schemas.microsoft.com/office/drawing/2014/main" id="{B94E1DB8-E79A-463D-A9FE-78888FA3CB96}"/>
+                <a16:creationId xmlns:a16="http://schemas.microsoft.com/office/drawing/2014/main" id="{3B1907DC-9D86-4526-979C-008496471E50}"/>
               </a:ext>
             </a:extLst>
           </p:cNvPr>
@@ -9991,8 +9991,8 @@
         </p:blipFill>
         <p:spPr>
           <a:xfrm>
-            <a:off x="1798320" y="853440"/>
-            <a:ext cx="8739502" cy="5332577"/>
+            <a:off x="1702101" y="952313"/>
+            <a:ext cx="8787797" cy="5233704"/>
           </a:xfrm>
           <a:prstGeom prst="rect">
             <a:avLst/>
@@ -10292,436 +10292,7 @@
           <a:p>
             <a:r>
               <a:rPr lang="en-US">
-                <a:latin typeface="Times New Roman" panose="02020603050405020304" pitchFamily="18" charset="0"/>
-                <a:cs typeface="Times New Roman" panose="02020603050405020304" pitchFamily="18" charset="0"/>
-              </a:rPr>
-              <a:t>2. Phân tích và thiết kế</a:t>
-            </a:r>
-          </a:p>
-        </p:txBody>
-      </p:sp>
-      <p:pic>
-        <p:nvPicPr>
-          <p:cNvPr id="3" name="Picture 2" descr="Diagram&#10;&#10;Description automatically generated">
-            <a:extLst>
-              <a:ext uri="{FF2B5EF4-FFF2-40B4-BE49-F238E27FC236}">
-                <a16:creationId xmlns:a16="http://schemas.microsoft.com/office/drawing/2014/main" id="{66F068DC-D3FF-4548-B21F-51C7C45264FE}"/>
-              </a:ext>
-            </a:extLst>
-          </p:cNvPr>
-          <p:cNvPicPr>
-            <a:picLocks noChangeAspect="1"/>
-          </p:cNvPicPr>
-          <p:nvPr/>
-        </p:nvPicPr>
-        <p:blipFill>
-          <a:blip r:embed="rId3">
-            <a:extLst>
-              <a:ext uri="{28A0092B-C50C-407E-A947-70E740481C1C}">
-                <a14:useLocalDpi xmlns:a14="http://schemas.microsoft.com/office/drawing/2010/main" val="0"/>
-              </a:ext>
-            </a:extLst>
-          </a:blip>
-          <a:stretch>
-            <a:fillRect/>
-          </a:stretch>
-        </p:blipFill>
-        <p:spPr>
-          <a:xfrm>
-            <a:off x="4224174" y="1484840"/>
-            <a:ext cx="5272365" cy="4801618"/>
-          </a:xfrm>
-          <a:prstGeom prst="rect">
-            <a:avLst/>
-          </a:prstGeom>
-        </p:spPr>
-      </p:pic>
-      <p:sp>
-        <p:nvSpPr>
-          <p:cNvPr id="7" name="Text Placeholder 2">
-            <a:extLst>
-              <a:ext uri="{FF2B5EF4-FFF2-40B4-BE49-F238E27FC236}">
-                <a16:creationId xmlns:a16="http://schemas.microsoft.com/office/drawing/2014/main" id="{D2EB9B74-DDA5-4D5A-8A44-2B4389B0A96D}"/>
-              </a:ext>
-            </a:extLst>
-          </p:cNvPr>
-          <p:cNvSpPr txBox="1">
-            <a:spLocks/>
-          </p:cNvSpPr>
-          <p:nvPr/>
-        </p:nvSpPr>
-        <p:spPr>
-          <a:xfrm>
-            <a:off x="11240542" y="5967968"/>
-            <a:ext cx="612722" cy="518470"/>
-          </a:xfrm>
-          <a:prstGeom prst="rect">
-            <a:avLst/>
-          </a:prstGeom>
-        </p:spPr>
-        <p:txBody>
-          <a:bodyPr/>
-          <a:lstStyle>
-            <a:lvl1pPr marL="228600" indent="-228600" algn="l" defTabSz="914400" rtl="0" eaLnBrk="1" latinLnBrk="0" hangingPunct="1">
-              <a:lnSpc>
-                <a:spcPct val="90000"/>
-              </a:lnSpc>
-              <a:spcBef>
-                <a:spcPts val="1000"/>
-              </a:spcBef>
-              <a:buFont typeface="Arial" panose="020B0604020202020204" pitchFamily="34" charset="0"/>
-              <a:buChar char="•"/>
-              <a:defRPr sz="2800" kern="1200">
-                <a:solidFill>
-                  <a:schemeClr val="tx1"/>
-                </a:solidFill>
-                <a:latin typeface="Lato" panose="020F0502020204030203" pitchFamily="34" charset="0"/>
-                <a:ea typeface="Lato" panose="020F0502020204030203" pitchFamily="34" charset="0"/>
-                <a:cs typeface="Lato" panose="020F0502020204030203" pitchFamily="34" charset="0"/>
-              </a:defRPr>
-            </a:lvl1pPr>
-            <a:lvl2pPr marL="685800" indent="-228600" algn="l" defTabSz="914400" rtl="0" eaLnBrk="1" latinLnBrk="0" hangingPunct="1">
-              <a:lnSpc>
-                <a:spcPct val="90000"/>
-              </a:lnSpc>
-              <a:spcBef>
-                <a:spcPts val="500"/>
-              </a:spcBef>
-              <a:buFont typeface="Arial" panose="020B0604020202020204" pitchFamily="34" charset="0"/>
-              <a:buChar char="•"/>
-              <a:defRPr sz="2400" kern="1200">
-                <a:solidFill>
-                  <a:schemeClr val="tx1"/>
-                </a:solidFill>
-                <a:latin typeface="Lato" panose="020F0502020204030203" pitchFamily="34" charset="0"/>
-                <a:ea typeface="Lato" panose="020F0502020204030203" pitchFamily="34" charset="0"/>
-                <a:cs typeface="Lato" panose="020F0502020204030203" pitchFamily="34" charset="0"/>
-              </a:defRPr>
-            </a:lvl2pPr>
-            <a:lvl3pPr marL="1143000" indent="-228600" algn="l" defTabSz="914400" rtl="0" eaLnBrk="1" latinLnBrk="0" hangingPunct="1">
-              <a:lnSpc>
-                <a:spcPct val="90000"/>
-              </a:lnSpc>
-              <a:spcBef>
-                <a:spcPts val="500"/>
-              </a:spcBef>
-              <a:buFont typeface="Arial" panose="020B0604020202020204" pitchFamily="34" charset="0"/>
-              <a:buChar char="•"/>
-              <a:defRPr sz="2000" kern="1200">
-                <a:solidFill>
-                  <a:schemeClr val="tx1"/>
-                </a:solidFill>
-                <a:latin typeface="Lato" panose="020F0502020204030203" pitchFamily="34" charset="0"/>
-                <a:ea typeface="Lato" panose="020F0502020204030203" pitchFamily="34" charset="0"/>
-                <a:cs typeface="Lato" panose="020F0502020204030203" pitchFamily="34" charset="0"/>
-              </a:defRPr>
-            </a:lvl3pPr>
-            <a:lvl4pPr marL="1600200" indent="-228600" algn="l" defTabSz="914400" rtl="0" eaLnBrk="1" latinLnBrk="0" hangingPunct="1">
-              <a:lnSpc>
-                <a:spcPct val="90000"/>
-              </a:lnSpc>
-              <a:spcBef>
-                <a:spcPts val="500"/>
-              </a:spcBef>
-              <a:buFont typeface="Arial" panose="020B0604020202020204" pitchFamily="34" charset="0"/>
-              <a:buChar char="•"/>
-              <a:defRPr sz="1800" kern="1200">
-                <a:solidFill>
-                  <a:schemeClr val="tx1"/>
-                </a:solidFill>
-                <a:latin typeface="Lato" panose="020F0502020204030203" pitchFamily="34" charset="0"/>
-                <a:ea typeface="Lato" panose="020F0502020204030203" pitchFamily="34" charset="0"/>
-                <a:cs typeface="Lato" panose="020F0502020204030203" pitchFamily="34" charset="0"/>
-              </a:defRPr>
-            </a:lvl4pPr>
-            <a:lvl5pPr marL="2057400" indent="-228600" algn="l" defTabSz="914400" rtl="0" eaLnBrk="1" latinLnBrk="0" hangingPunct="1">
-              <a:lnSpc>
-                <a:spcPct val="90000"/>
-              </a:lnSpc>
-              <a:spcBef>
-                <a:spcPts val="500"/>
-              </a:spcBef>
-              <a:buFont typeface="Arial" panose="020B0604020202020204" pitchFamily="34" charset="0"/>
-              <a:buChar char="•"/>
-              <a:defRPr sz="1800" kern="1200">
-                <a:solidFill>
-                  <a:schemeClr val="tx1"/>
-                </a:solidFill>
-                <a:latin typeface="Lato" panose="020F0502020204030203" pitchFamily="34" charset="0"/>
-                <a:ea typeface="Lato" panose="020F0502020204030203" pitchFamily="34" charset="0"/>
-                <a:cs typeface="Lato" panose="020F0502020204030203" pitchFamily="34" charset="0"/>
-              </a:defRPr>
-            </a:lvl5pPr>
-            <a:lvl6pPr marL="2514600" indent="-228600" algn="l" defTabSz="914400" rtl="0" eaLnBrk="1" latinLnBrk="0" hangingPunct="1">
-              <a:lnSpc>
-                <a:spcPct val="90000"/>
-              </a:lnSpc>
-              <a:spcBef>
-                <a:spcPts val="500"/>
-              </a:spcBef>
-              <a:buFont typeface="Arial" panose="020B0604020202020204" pitchFamily="34" charset="0"/>
-              <a:buChar char="•"/>
-              <a:defRPr sz="1800" kern="1200">
-                <a:solidFill>
-                  <a:schemeClr val="tx1"/>
-                </a:solidFill>
-                <a:latin typeface="+mn-lt"/>
-                <a:ea typeface="+mn-ea"/>
-                <a:cs typeface="+mn-cs"/>
-              </a:defRPr>
-            </a:lvl6pPr>
-            <a:lvl7pPr marL="2971800" indent="-228600" algn="l" defTabSz="914400" rtl="0" eaLnBrk="1" latinLnBrk="0" hangingPunct="1">
-              <a:lnSpc>
-                <a:spcPct val="90000"/>
-              </a:lnSpc>
-              <a:spcBef>
-                <a:spcPts val="500"/>
-              </a:spcBef>
-              <a:buFont typeface="Arial" panose="020B0604020202020204" pitchFamily="34" charset="0"/>
-              <a:buChar char="•"/>
-              <a:defRPr sz="1800" kern="1200">
-                <a:solidFill>
-                  <a:schemeClr val="tx1"/>
-                </a:solidFill>
-                <a:latin typeface="+mn-lt"/>
-                <a:ea typeface="+mn-ea"/>
-                <a:cs typeface="+mn-cs"/>
-              </a:defRPr>
-            </a:lvl7pPr>
-            <a:lvl8pPr marL="3429000" indent="-228600" algn="l" defTabSz="914400" rtl="0" eaLnBrk="1" latinLnBrk="0" hangingPunct="1">
-              <a:lnSpc>
-                <a:spcPct val="90000"/>
-              </a:lnSpc>
-              <a:spcBef>
-                <a:spcPts val="500"/>
-              </a:spcBef>
-              <a:buFont typeface="Arial" panose="020B0604020202020204" pitchFamily="34" charset="0"/>
-              <a:buChar char="•"/>
-              <a:defRPr sz="1800" kern="1200">
-                <a:solidFill>
-                  <a:schemeClr val="tx1"/>
-                </a:solidFill>
-                <a:latin typeface="+mn-lt"/>
-                <a:ea typeface="+mn-ea"/>
-                <a:cs typeface="+mn-cs"/>
-              </a:defRPr>
-            </a:lvl8pPr>
-            <a:lvl9pPr marL="3886200" indent="-228600" algn="l" defTabSz="914400" rtl="0" eaLnBrk="1" latinLnBrk="0" hangingPunct="1">
-              <a:lnSpc>
-                <a:spcPct val="90000"/>
-              </a:lnSpc>
-              <a:spcBef>
-                <a:spcPts val="500"/>
-              </a:spcBef>
-              <a:buFont typeface="Arial" panose="020B0604020202020204" pitchFamily="34" charset="0"/>
-              <a:buChar char="•"/>
-              <a:defRPr sz="1800" kern="1200">
-                <a:solidFill>
-                  <a:schemeClr val="tx1"/>
-                </a:solidFill>
-                <a:latin typeface="+mn-lt"/>
-                <a:ea typeface="+mn-ea"/>
-                <a:cs typeface="+mn-cs"/>
-              </a:defRPr>
-            </a:lvl9pPr>
-          </a:lstStyle>
-          <a:p>
-            <a:pPr marL="0" indent="0" algn="ctr">
-              <a:buFont typeface="Arial" panose="020B0604020202020204" pitchFamily="34" charset="0"/>
-              <a:buNone/>
-            </a:pPr>
-            <a:r>
-              <a:rPr lang="en-US" dirty="0">
-                <a:latin typeface="Times New Roman" panose="02020603050405020304" pitchFamily="18" charset="0"/>
-                <a:cs typeface="Times New Roman" panose="02020603050405020304" pitchFamily="18" charset="0"/>
-              </a:rPr>
-              <a:t>14</a:t>
-            </a:r>
-            <a:endParaRPr lang="vi-VN" dirty="0">
-              <a:latin typeface="Times New Roman" panose="02020603050405020304" pitchFamily="18" charset="0"/>
-              <a:cs typeface="Times New Roman" panose="02020603050405020304" pitchFamily="18" charset="0"/>
-            </a:endParaRPr>
-          </a:p>
-        </p:txBody>
-      </p:sp>
-    </p:spTree>
-    <p:extLst>
-      <p:ext uri="{BB962C8B-B14F-4D97-AF65-F5344CB8AC3E}">
-        <p14:creationId xmlns:p14="http://schemas.microsoft.com/office/powerpoint/2010/main" val="2379372365"/>
-      </p:ext>
-    </p:extLst>
-  </p:cSld>
-  <p:clrMapOvr>
-    <a:masterClrMapping/>
-  </p:clrMapOvr>
-</p:sld>
-</file>
-
-<file path=ppt/slides/slide18.xml><?xml version="1.0" encoding="utf-8"?>
-<p:sld xmlns:a="http://schemas.openxmlformats.org/drawingml/2006/main" xmlns:r="http://schemas.openxmlformats.org/officeDocument/2006/relationships" xmlns:p="http://schemas.openxmlformats.org/presentationml/2006/main">
-  <p:cSld>
-    <p:spTree>
-      <p:nvGrpSpPr>
-        <p:cNvPr id="1" name=""/>
-        <p:cNvGrpSpPr/>
-        <p:nvPr/>
-      </p:nvGrpSpPr>
-      <p:grpSpPr>
-        <a:xfrm>
-          <a:off x="0" y="0"/>
-          <a:ext cx="0" cy="0"/>
-          <a:chOff x="0" y="0"/>
-          <a:chExt cx="0" cy="0"/>
-        </a:xfrm>
-      </p:grpSpPr>
-      <p:sp>
-        <p:nvSpPr>
-          <p:cNvPr id="5" name="Content Placeholder 4">
-            <a:extLst>
-              <a:ext uri="{FF2B5EF4-FFF2-40B4-BE49-F238E27FC236}">
-                <a16:creationId xmlns:a16="http://schemas.microsoft.com/office/drawing/2014/main" id="{82AD3B8F-023F-4D30-80AA-BE5F44F41593}"/>
-              </a:ext>
-            </a:extLst>
-          </p:cNvPr>
-          <p:cNvSpPr>
-            <a:spLocks noGrp="1"/>
-          </p:cNvSpPr>
-          <p:nvPr>
-            <p:ph sz="quarter" idx="10"/>
-          </p:nvPr>
-        </p:nvSpPr>
-        <p:spPr/>
-        <p:txBody>
-          <a:bodyPr/>
-          <a:lstStyle/>
-          <a:p>
-            <a:pPr marL="0" indent="0">
-              <a:buNone/>
-            </a:pPr>
-            <a:r>
-              <a:rPr lang="en-US" dirty="0">
-                <a:latin typeface="Times New Roman" panose="02020603050405020304" pitchFamily="18" charset="0"/>
-                <a:cs typeface="Times New Roman" panose="02020603050405020304" pitchFamily="18" charset="0"/>
-              </a:rPr>
-              <a:t>2.3. </a:t>
-            </a:r>
-            <a:r>
-              <a:rPr lang="en-US" dirty="0" err="1">
-                <a:latin typeface="Times New Roman" panose="02020603050405020304" pitchFamily="18" charset="0"/>
-                <a:cs typeface="Times New Roman" panose="02020603050405020304" pitchFamily="18" charset="0"/>
-              </a:rPr>
-              <a:t>Thiết</a:t>
-            </a:r>
-            <a:r>
-              <a:rPr lang="en-US" dirty="0">
-                <a:latin typeface="Times New Roman" panose="02020603050405020304" pitchFamily="18" charset="0"/>
-                <a:cs typeface="Times New Roman" panose="02020603050405020304" pitchFamily="18" charset="0"/>
-              </a:rPr>
-              <a:t> </a:t>
-            </a:r>
-            <a:r>
-              <a:rPr lang="en-US" dirty="0" err="1">
-                <a:latin typeface="Times New Roman" panose="02020603050405020304" pitchFamily="18" charset="0"/>
-                <a:cs typeface="Times New Roman" panose="02020603050405020304" pitchFamily="18" charset="0"/>
-              </a:rPr>
-              <a:t>kế</a:t>
-            </a:r>
-            <a:r>
-              <a:rPr lang="en-US" dirty="0">
-                <a:latin typeface="Times New Roman" panose="02020603050405020304" pitchFamily="18" charset="0"/>
-                <a:cs typeface="Times New Roman" panose="02020603050405020304" pitchFamily="18" charset="0"/>
-              </a:rPr>
-              <a:t> </a:t>
-            </a:r>
-            <a:r>
-              <a:rPr lang="en-US" dirty="0" err="1">
-                <a:latin typeface="Times New Roman" panose="02020603050405020304" pitchFamily="18" charset="0"/>
-                <a:cs typeface="Times New Roman" panose="02020603050405020304" pitchFamily="18" charset="0"/>
-              </a:rPr>
-              <a:t>chương</a:t>
-            </a:r>
-            <a:r>
-              <a:rPr lang="en-US" dirty="0">
-                <a:latin typeface="Times New Roman" panose="02020603050405020304" pitchFamily="18" charset="0"/>
-                <a:cs typeface="Times New Roman" panose="02020603050405020304" pitchFamily="18" charset="0"/>
-              </a:rPr>
-              <a:t> </a:t>
-            </a:r>
-            <a:r>
-              <a:rPr lang="en-US" dirty="0" err="1">
-                <a:latin typeface="Times New Roman" panose="02020603050405020304" pitchFamily="18" charset="0"/>
-                <a:cs typeface="Times New Roman" panose="02020603050405020304" pitchFamily="18" charset="0"/>
-              </a:rPr>
-              <a:t>trình</a:t>
-            </a:r>
-            <a:r>
-              <a:rPr lang="en-US" dirty="0">
-                <a:latin typeface="Times New Roman" panose="02020603050405020304" pitchFamily="18" charset="0"/>
-                <a:cs typeface="Times New Roman" panose="02020603050405020304" pitchFamily="18" charset="0"/>
-              </a:rPr>
-              <a:t> vi </a:t>
-            </a:r>
-            <a:r>
-              <a:rPr lang="en-US" dirty="0" err="1">
-                <a:latin typeface="Times New Roman" panose="02020603050405020304" pitchFamily="18" charset="0"/>
-                <a:cs typeface="Times New Roman" panose="02020603050405020304" pitchFamily="18" charset="0"/>
-              </a:rPr>
-              <a:t>điều</a:t>
-            </a:r>
-            <a:r>
-              <a:rPr lang="en-US" dirty="0">
-                <a:latin typeface="Times New Roman" panose="02020603050405020304" pitchFamily="18" charset="0"/>
-                <a:cs typeface="Times New Roman" panose="02020603050405020304" pitchFamily="18" charset="0"/>
-              </a:rPr>
-              <a:t> </a:t>
-            </a:r>
-            <a:r>
-              <a:rPr lang="en-US" dirty="0" err="1">
-                <a:latin typeface="Times New Roman" panose="02020603050405020304" pitchFamily="18" charset="0"/>
-                <a:cs typeface="Times New Roman" panose="02020603050405020304" pitchFamily="18" charset="0"/>
-              </a:rPr>
-              <a:t>khiển</a:t>
-            </a:r>
-            <a:endParaRPr lang="en-US" dirty="0">
-              <a:latin typeface="Times New Roman" panose="02020603050405020304" pitchFamily="18" charset="0"/>
-              <a:cs typeface="Times New Roman" panose="02020603050405020304" pitchFamily="18" charset="0"/>
-            </a:endParaRPr>
-          </a:p>
-          <a:p>
-            <a:pPr marL="0" indent="0">
-              <a:buNone/>
-            </a:pPr>
-            <a:endParaRPr lang="vi-VN" dirty="0">
-              <a:latin typeface="Times New Roman" panose="02020603050405020304" pitchFamily="18" charset="0"/>
-              <a:cs typeface="Times New Roman" panose="02020603050405020304" pitchFamily="18" charset="0"/>
-            </a:endParaRPr>
-          </a:p>
-        </p:txBody>
-      </p:sp>
-      <p:sp>
-        <p:nvSpPr>
-          <p:cNvPr id="4" name="Title 3">
-            <a:extLst>
-              <a:ext uri="{FF2B5EF4-FFF2-40B4-BE49-F238E27FC236}">
-                <a16:creationId xmlns:a16="http://schemas.microsoft.com/office/drawing/2014/main" id="{52E18D06-2298-4C20-BF3D-F4536777C955}"/>
-              </a:ext>
-            </a:extLst>
-          </p:cNvPr>
-          <p:cNvSpPr>
-            <a:spLocks noGrp="1"/>
-          </p:cNvSpPr>
-          <p:nvPr>
-            <p:ph type="title"/>
-          </p:nvPr>
-        </p:nvSpPr>
-        <p:spPr/>
-        <p:txBody>
-          <a:bodyPr/>
-          <a:lstStyle/>
-          <a:p>
-            <a:r>
-              <a:rPr lang="en-US">
-                <a:latin typeface="Times New Roman" panose="02020603050405020304" pitchFamily="18" charset="0"/>
+                <a:latin typeface="+mn-lt"/>
                 <a:cs typeface="Times New Roman" panose="02020603050405020304" pitchFamily="18" charset="0"/>
               </a:rPr>
               <a:t>2. Phân tích và thiết kế</a:t>
@@ -10939,6 +10510,429 @@
       </p:sp>
       <p:pic>
         <p:nvPicPr>
+          <p:cNvPr id="6" name="Picture 5">
+            <a:extLst>
+              <a:ext uri="{FF2B5EF4-FFF2-40B4-BE49-F238E27FC236}">
+                <a16:creationId xmlns:a16="http://schemas.microsoft.com/office/drawing/2014/main" id="{C9BF0E6B-FA4E-4D6A-AAAC-DF2906E2F7FB}"/>
+              </a:ext>
+            </a:extLst>
+          </p:cNvPr>
+          <p:cNvPicPr>
+            <a:picLocks noChangeAspect="1"/>
+          </p:cNvPicPr>
+          <p:nvPr/>
+        </p:nvPicPr>
+        <p:blipFill>
+          <a:blip r:embed="rId3"/>
+          <a:stretch>
+            <a:fillRect/>
+          </a:stretch>
+        </p:blipFill>
+        <p:spPr>
+          <a:xfrm>
+            <a:off x="5244955" y="1534509"/>
+            <a:ext cx="5470997" cy="4791075"/>
+          </a:xfrm>
+          <a:prstGeom prst="rect">
+            <a:avLst/>
+          </a:prstGeom>
+        </p:spPr>
+      </p:pic>
+    </p:spTree>
+    <p:extLst>
+      <p:ext uri="{BB962C8B-B14F-4D97-AF65-F5344CB8AC3E}">
+        <p14:creationId xmlns:p14="http://schemas.microsoft.com/office/powerpoint/2010/main" val="2379372365"/>
+      </p:ext>
+    </p:extLst>
+  </p:cSld>
+  <p:clrMapOvr>
+    <a:masterClrMapping/>
+  </p:clrMapOvr>
+</p:sld>
+</file>
+
+<file path=ppt/slides/slide18.xml><?xml version="1.0" encoding="utf-8"?>
+<p:sld xmlns:a="http://schemas.openxmlformats.org/drawingml/2006/main" xmlns:r="http://schemas.openxmlformats.org/officeDocument/2006/relationships" xmlns:p="http://schemas.openxmlformats.org/presentationml/2006/main">
+  <p:cSld>
+    <p:spTree>
+      <p:nvGrpSpPr>
+        <p:cNvPr id="1" name=""/>
+        <p:cNvGrpSpPr/>
+        <p:nvPr/>
+      </p:nvGrpSpPr>
+      <p:grpSpPr>
+        <a:xfrm>
+          <a:off x="0" y="0"/>
+          <a:ext cx="0" cy="0"/>
+          <a:chOff x="0" y="0"/>
+          <a:chExt cx="0" cy="0"/>
+        </a:xfrm>
+      </p:grpSpPr>
+      <p:sp>
+        <p:nvSpPr>
+          <p:cNvPr id="5" name="Content Placeholder 4">
+            <a:extLst>
+              <a:ext uri="{FF2B5EF4-FFF2-40B4-BE49-F238E27FC236}">
+                <a16:creationId xmlns:a16="http://schemas.microsoft.com/office/drawing/2014/main" id="{82AD3B8F-023F-4D30-80AA-BE5F44F41593}"/>
+              </a:ext>
+            </a:extLst>
+          </p:cNvPr>
+          <p:cNvSpPr>
+            <a:spLocks noGrp="1"/>
+          </p:cNvSpPr>
+          <p:nvPr>
+            <p:ph sz="quarter" idx="10"/>
+          </p:nvPr>
+        </p:nvSpPr>
+        <p:spPr/>
+        <p:txBody>
+          <a:bodyPr/>
+          <a:lstStyle/>
+          <a:p>
+            <a:pPr marL="0" indent="0">
+              <a:buNone/>
+            </a:pPr>
+            <a:r>
+              <a:rPr lang="en-US" dirty="0">
+                <a:latin typeface="Times New Roman" panose="02020603050405020304" pitchFamily="18" charset="0"/>
+                <a:cs typeface="Times New Roman" panose="02020603050405020304" pitchFamily="18" charset="0"/>
+              </a:rPr>
+              <a:t>2.3. </a:t>
+            </a:r>
+            <a:r>
+              <a:rPr lang="en-US" dirty="0" err="1">
+                <a:latin typeface="Times New Roman" panose="02020603050405020304" pitchFamily="18" charset="0"/>
+                <a:cs typeface="Times New Roman" panose="02020603050405020304" pitchFamily="18" charset="0"/>
+              </a:rPr>
+              <a:t>Thiết</a:t>
+            </a:r>
+            <a:r>
+              <a:rPr lang="en-US" dirty="0">
+                <a:latin typeface="Times New Roman" panose="02020603050405020304" pitchFamily="18" charset="0"/>
+                <a:cs typeface="Times New Roman" panose="02020603050405020304" pitchFamily="18" charset="0"/>
+              </a:rPr>
+              <a:t> </a:t>
+            </a:r>
+            <a:r>
+              <a:rPr lang="en-US" dirty="0" err="1">
+                <a:latin typeface="Times New Roman" panose="02020603050405020304" pitchFamily="18" charset="0"/>
+                <a:cs typeface="Times New Roman" panose="02020603050405020304" pitchFamily="18" charset="0"/>
+              </a:rPr>
+              <a:t>kế</a:t>
+            </a:r>
+            <a:r>
+              <a:rPr lang="en-US" dirty="0">
+                <a:latin typeface="Times New Roman" panose="02020603050405020304" pitchFamily="18" charset="0"/>
+                <a:cs typeface="Times New Roman" panose="02020603050405020304" pitchFamily="18" charset="0"/>
+              </a:rPr>
+              <a:t> </a:t>
+            </a:r>
+            <a:r>
+              <a:rPr lang="en-US" dirty="0" err="1">
+                <a:latin typeface="Times New Roman" panose="02020603050405020304" pitchFamily="18" charset="0"/>
+                <a:cs typeface="Times New Roman" panose="02020603050405020304" pitchFamily="18" charset="0"/>
+              </a:rPr>
+              <a:t>chương</a:t>
+            </a:r>
+            <a:r>
+              <a:rPr lang="en-US" dirty="0">
+                <a:latin typeface="Times New Roman" panose="02020603050405020304" pitchFamily="18" charset="0"/>
+                <a:cs typeface="Times New Roman" panose="02020603050405020304" pitchFamily="18" charset="0"/>
+              </a:rPr>
+              <a:t> </a:t>
+            </a:r>
+            <a:r>
+              <a:rPr lang="en-US" dirty="0" err="1">
+                <a:latin typeface="Times New Roman" panose="02020603050405020304" pitchFamily="18" charset="0"/>
+                <a:cs typeface="Times New Roman" panose="02020603050405020304" pitchFamily="18" charset="0"/>
+              </a:rPr>
+              <a:t>trình</a:t>
+            </a:r>
+            <a:r>
+              <a:rPr lang="en-US" dirty="0">
+                <a:latin typeface="Times New Roman" panose="02020603050405020304" pitchFamily="18" charset="0"/>
+                <a:cs typeface="Times New Roman" panose="02020603050405020304" pitchFamily="18" charset="0"/>
+              </a:rPr>
+              <a:t> vi </a:t>
+            </a:r>
+            <a:r>
+              <a:rPr lang="en-US" dirty="0" err="1">
+                <a:latin typeface="Times New Roman" panose="02020603050405020304" pitchFamily="18" charset="0"/>
+                <a:cs typeface="Times New Roman" panose="02020603050405020304" pitchFamily="18" charset="0"/>
+              </a:rPr>
+              <a:t>điều</a:t>
+            </a:r>
+            <a:r>
+              <a:rPr lang="en-US" dirty="0">
+                <a:latin typeface="Times New Roman" panose="02020603050405020304" pitchFamily="18" charset="0"/>
+                <a:cs typeface="Times New Roman" panose="02020603050405020304" pitchFamily="18" charset="0"/>
+              </a:rPr>
+              <a:t> </a:t>
+            </a:r>
+            <a:r>
+              <a:rPr lang="en-US" dirty="0" err="1">
+                <a:latin typeface="Times New Roman" panose="02020603050405020304" pitchFamily="18" charset="0"/>
+                <a:cs typeface="Times New Roman" panose="02020603050405020304" pitchFamily="18" charset="0"/>
+              </a:rPr>
+              <a:t>khiển</a:t>
+            </a:r>
+            <a:endParaRPr lang="en-US" dirty="0">
+              <a:latin typeface="Times New Roman" panose="02020603050405020304" pitchFamily="18" charset="0"/>
+              <a:cs typeface="Times New Roman" panose="02020603050405020304" pitchFamily="18" charset="0"/>
+            </a:endParaRPr>
+          </a:p>
+          <a:p>
+            <a:pPr marL="0" indent="0">
+              <a:buNone/>
+            </a:pPr>
+            <a:endParaRPr lang="vi-VN" dirty="0">
+              <a:latin typeface="Times New Roman" panose="02020603050405020304" pitchFamily="18" charset="0"/>
+              <a:cs typeface="Times New Roman" panose="02020603050405020304" pitchFamily="18" charset="0"/>
+            </a:endParaRPr>
+          </a:p>
+        </p:txBody>
+      </p:sp>
+      <p:sp>
+        <p:nvSpPr>
+          <p:cNvPr id="4" name="Title 3">
+            <a:extLst>
+              <a:ext uri="{FF2B5EF4-FFF2-40B4-BE49-F238E27FC236}">
+                <a16:creationId xmlns:a16="http://schemas.microsoft.com/office/drawing/2014/main" id="{52E18D06-2298-4C20-BF3D-F4536777C955}"/>
+              </a:ext>
+            </a:extLst>
+          </p:cNvPr>
+          <p:cNvSpPr>
+            <a:spLocks noGrp="1"/>
+          </p:cNvSpPr>
+          <p:nvPr>
+            <p:ph type="title"/>
+          </p:nvPr>
+        </p:nvSpPr>
+        <p:spPr/>
+        <p:txBody>
+          <a:bodyPr/>
+          <a:lstStyle/>
+          <a:p>
+            <a:r>
+              <a:rPr lang="en-US">
+                <a:latin typeface="+mn-lt"/>
+                <a:cs typeface="Times New Roman" panose="02020603050405020304" pitchFamily="18" charset="0"/>
+              </a:rPr>
+              <a:t>2. Phân tích và thiết kế</a:t>
+            </a:r>
+          </a:p>
+        </p:txBody>
+      </p:sp>
+      <p:sp>
+        <p:nvSpPr>
+          <p:cNvPr id="7" name="Text Placeholder 2">
+            <a:extLst>
+              <a:ext uri="{FF2B5EF4-FFF2-40B4-BE49-F238E27FC236}">
+                <a16:creationId xmlns:a16="http://schemas.microsoft.com/office/drawing/2014/main" id="{D2EB9B74-DDA5-4D5A-8A44-2B4389B0A96D}"/>
+              </a:ext>
+            </a:extLst>
+          </p:cNvPr>
+          <p:cNvSpPr txBox="1">
+            <a:spLocks/>
+          </p:cNvSpPr>
+          <p:nvPr/>
+        </p:nvSpPr>
+        <p:spPr>
+          <a:xfrm>
+            <a:off x="11240542" y="5967968"/>
+            <a:ext cx="612722" cy="518470"/>
+          </a:xfrm>
+          <a:prstGeom prst="rect">
+            <a:avLst/>
+          </a:prstGeom>
+        </p:spPr>
+        <p:txBody>
+          <a:bodyPr/>
+          <a:lstStyle>
+            <a:lvl1pPr marL="228600" indent="-228600" algn="l" defTabSz="914400" rtl="0" eaLnBrk="1" latinLnBrk="0" hangingPunct="1">
+              <a:lnSpc>
+                <a:spcPct val="90000"/>
+              </a:lnSpc>
+              <a:spcBef>
+                <a:spcPts val="1000"/>
+              </a:spcBef>
+              <a:buFont typeface="Arial" panose="020B0604020202020204" pitchFamily="34" charset="0"/>
+              <a:buChar char="•"/>
+              <a:defRPr sz="2800" kern="1200">
+                <a:solidFill>
+                  <a:schemeClr val="tx1"/>
+                </a:solidFill>
+                <a:latin typeface="Lato" panose="020F0502020204030203" pitchFamily="34" charset="0"/>
+                <a:ea typeface="Lato" panose="020F0502020204030203" pitchFamily="34" charset="0"/>
+                <a:cs typeface="Lato" panose="020F0502020204030203" pitchFamily="34" charset="0"/>
+              </a:defRPr>
+            </a:lvl1pPr>
+            <a:lvl2pPr marL="685800" indent="-228600" algn="l" defTabSz="914400" rtl="0" eaLnBrk="1" latinLnBrk="0" hangingPunct="1">
+              <a:lnSpc>
+                <a:spcPct val="90000"/>
+              </a:lnSpc>
+              <a:spcBef>
+                <a:spcPts val="500"/>
+              </a:spcBef>
+              <a:buFont typeface="Arial" panose="020B0604020202020204" pitchFamily="34" charset="0"/>
+              <a:buChar char="•"/>
+              <a:defRPr sz="2400" kern="1200">
+                <a:solidFill>
+                  <a:schemeClr val="tx1"/>
+                </a:solidFill>
+                <a:latin typeface="Lato" panose="020F0502020204030203" pitchFamily="34" charset="0"/>
+                <a:ea typeface="Lato" panose="020F0502020204030203" pitchFamily="34" charset="0"/>
+                <a:cs typeface="Lato" panose="020F0502020204030203" pitchFamily="34" charset="0"/>
+              </a:defRPr>
+            </a:lvl2pPr>
+            <a:lvl3pPr marL="1143000" indent="-228600" algn="l" defTabSz="914400" rtl="0" eaLnBrk="1" latinLnBrk="0" hangingPunct="1">
+              <a:lnSpc>
+                <a:spcPct val="90000"/>
+              </a:lnSpc>
+              <a:spcBef>
+                <a:spcPts val="500"/>
+              </a:spcBef>
+              <a:buFont typeface="Arial" panose="020B0604020202020204" pitchFamily="34" charset="0"/>
+              <a:buChar char="•"/>
+              <a:defRPr sz="2000" kern="1200">
+                <a:solidFill>
+                  <a:schemeClr val="tx1"/>
+                </a:solidFill>
+                <a:latin typeface="Lato" panose="020F0502020204030203" pitchFamily="34" charset="0"/>
+                <a:ea typeface="Lato" panose="020F0502020204030203" pitchFamily="34" charset="0"/>
+                <a:cs typeface="Lato" panose="020F0502020204030203" pitchFamily="34" charset="0"/>
+              </a:defRPr>
+            </a:lvl3pPr>
+            <a:lvl4pPr marL="1600200" indent="-228600" algn="l" defTabSz="914400" rtl="0" eaLnBrk="1" latinLnBrk="0" hangingPunct="1">
+              <a:lnSpc>
+                <a:spcPct val="90000"/>
+              </a:lnSpc>
+              <a:spcBef>
+                <a:spcPts val="500"/>
+              </a:spcBef>
+              <a:buFont typeface="Arial" panose="020B0604020202020204" pitchFamily="34" charset="0"/>
+              <a:buChar char="•"/>
+              <a:defRPr sz="1800" kern="1200">
+                <a:solidFill>
+                  <a:schemeClr val="tx1"/>
+                </a:solidFill>
+                <a:latin typeface="Lato" panose="020F0502020204030203" pitchFamily="34" charset="0"/>
+                <a:ea typeface="Lato" panose="020F0502020204030203" pitchFamily="34" charset="0"/>
+                <a:cs typeface="Lato" panose="020F0502020204030203" pitchFamily="34" charset="0"/>
+              </a:defRPr>
+            </a:lvl4pPr>
+            <a:lvl5pPr marL="2057400" indent="-228600" algn="l" defTabSz="914400" rtl="0" eaLnBrk="1" latinLnBrk="0" hangingPunct="1">
+              <a:lnSpc>
+                <a:spcPct val="90000"/>
+              </a:lnSpc>
+              <a:spcBef>
+                <a:spcPts val="500"/>
+              </a:spcBef>
+              <a:buFont typeface="Arial" panose="020B0604020202020204" pitchFamily="34" charset="0"/>
+              <a:buChar char="•"/>
+              <a:defRPr sz="1800" kern="1200">
+                <a:solidFill>
+                  <a:schemeClr val="tx1"/>
+                </a:solidFill>
+                <a:latin typeface="Lato" panose="020F0502020204030203" pitchFamily="34" charset="0"/>
+                <a:ea typeface="Lato" panose="020F0502020204030203" pitchFamily="34" charset="0"/>
+                <a:cs typeface="Lato" panose="020F0502020204030203" pitchFamily="34" charset="0"/>
+              </a:defRPr>
+            </a:lvl5pPr>
+            <a:lvl6pPr marL="2514600" indent="-228600" algn="l" defTabSz="914400" rtl="0" eaLnBrk="1" latinLnBrk="0" hangingPunct="1">
+              <a:lnSpc>
+                <a:spcPct val="90000"/>
+              </a:lnSpc>
+              <a:spcBef>
+                <a:spcPts val="500"/>
+              </a:spcBef>
+              <a:buFont typeface="Arial" panose="020B0604020202020204" pitchFamily="34" charset="0"/>
+              <a:buChar char="•"/>
+              <a:defRPr sz="1800" kern="1200">
+                <a:solidFill>
+                  <a:schemeClr val="tx1"/>
+                </a:solidFill>
+                <a:latin typeface="+mn-lt"/>
+                <a:ea typeface="+mn-ea"/>
+                <a:cs typeface="+mn-cs"/>
+              </a:defRPr>
+            </a:lvl6pPr>
+            <a:lvl7pPr marL="2971800" indent="-228600" algn="l" defTabSz="914400" rtl="0" eaLnBrk="1" latinLnBrk="0" hangingPunct="1">
+              <a:lnSpc>
+                <a:spcPct val="90000"/>
+              </a:lnSpc>
+              <a:spcBef>
+                <a:spcPts val="500"/>
+              </a:spcBef>
+              <a:buFont typeface="Arial" panose="020B0604020202020204" pitchFamily="34" charset="0"/>
+              <a:buChar char="•"/>
+              <a:defRPr sz="1800" kern="1200">
+                <a:solidFill>
+                  <a:schemeClr val="tx1"/>
+                </a:solidFill>
+                <a:latin typeface="+mn-lt"/>
+                <a:ea typeface="+mn-ea"/>
+                <a:cs typeface="+mn-cs"/>
+              </a:defRPr>
+            </a:lvl7pPr>
+            <a:lvl8pPr marL="3429000" indent="-228600" algn="l" defTabSz="914400" rtl="0" eaLnBrk="1" latinLnBrk="0" hangingPunct="1">
+              <a:lnSpc>
+                <a:spcPct val="90000"/>
+              </a:lnSpc>
+              <a:spcBef>
+                <a:spcPts val="500"/>
+              </a:spcBef>
+              <a:buFont typeface="Arial" panose="020B0604020202020204" pitchFamily="34" charset="0"/>
+              <a:buChar char="•"/>
+              <a:defRPr sz="1800" kern="1200">
+                <a:solidFill>
+                  <a:schemeClr val="tx1"/>
+                </a:solidFill>
+                <a:latin typeface="+mn-lt"/>
+                <a:ea typeface="+mn-ea"/>
+                <a:cs typeface="+mn-cs"/>
+              </a:defRPr>
+            </a:lvl8pPr>
+            <a:lvl9pPr marL="3886200" indent="-228600" algn="l" defTabSz="914400" rtl="0" eaLnBrk="1" latinLnBrk="0" hangingPunct="1">
+              <a:lnSpc>
+                <a:spcPct val="90000"/>
+              </a:lnSpc>
+              <a:spcBef>
+                <a:spcPts val="500"/>
+              </a:spcBef>
+              <a:buFont typeface="Arial" panose="020B0604020202020204" pitchFamily="34" charset="0"/>
+              <a:buChar char="•"/>
+              <a:defRPr sz="1800" kern="1200">
+                <a:solidFill>
+                  <a:schemeClr val="tx1"/>
+                </a:solidFill>
+                <a:latin typeface="+mn-lt"/>
+                <a:ea typeface="+mn-ea"/>
+                <a:cs typeface="+mn-cs"/>
+              </a:defRPr>
+            </a:lvl9pPr>
+          </a:lstStyle>
+          <a:p>
+            <a:pPr marL="0" indent="0" algn="ctr">
+              <a:buFont typeface="Arial" panose="020B0604020202020204" pitchFamily="34" charset="0"/>
+              <a:buNone/>
+            </a:pPr>
+            <a:r>
+              <a:rPr lang="en-US">
+                <a:latin typeface="Times New Roman" panose="02020603050405020304" pitchFamily="18" charset="0"/>
+                <a:cs typeface="Times New Roman" panose="02020603050405020304" pitchFamily="18" charset="0"/>
+              </a:rPr>
+              <a:t>15</a:t>
+            </a:r>
+            <a:endParaRPr lang="vi-VN" dirty="0">
+              <a:latin typeface="Times New Roman" panose="02020603050405020304" pitchFamily="18" charset="0"/>
+              <a:cs typeface="Times New Roman" panose="02020603050405020304" pitchFamily="18" charset="0"/>
+            </a:endParaRPr>
+          </a:p>
+        </p:txBody>
+      </p:sp>
+      <p:pic>
+        <p:nvPicPr>
           <p:cNvPr id="9" name="Picture 8">
             <a:extLst>
               <a:ext uri="{FF2B5EF4-FFF2-40B4-BE49-F238E27FC236}">
@@ -11927,11 +11921,11 @@
               <a:buNone/>
             </a:pPr>
             <a:r>
-              <a:rPr lang="en-US" dirty="0">
+              <a:rPr lang="en-US">
                 <a:latin typeface="Times New Roman" panose="02020603050405020304" pitchFamily="18" charset="0"/>
                 <a:cs typeface="Times New Roman" panose="02020603050405020304" pitchFamily="18" charset="0"/>
               </a:rPr>
-              <a:t>18</a:t>
+              <a:t>16</a:t>
             </a:r>
             <a:endParaRPr lang="vi-VN" dirty="0">
               <a:latin typeface="Times New Roman" panose="02020603050405020304" pitchFamily="18" charset="0"/>
@@ -14446,11 +14440,11 @@
               <a:buNone/>
             </a:pPr>
             <a:r>
-              <a:rPr lang="en-US" dirty="0">
+              <a:rPr lang="en-US">
                 <a:latin typeface="Times New Roman" panose="02020603050405020304" pitchFamily="18" charset="0"/>
                 <a:cs typeface="Times New Roman" panose="02020603050405020304" pitchFamily="18" charset="0"/>
               </a:rPr>
-              <a:t>23</a:t>
+              <a:t>17</a:t>
             </a:r>
             <a:endParaRPr lang="vi-VN" dirty="0">
               <a:latin typeface="Times New Roman" panose="02020603050405020304" pitchFamily="18" charset="0"/>
@@ -15269,11 +15263,11 @@
               <a:buNone/>
             </a:pPr>
             <a:r>
-              <a:rPr lang="en-US" dirty="0">
+              <a:rPr lang="en-US">
                 <a:latin typeface="Times New Roman" panose="02020603050405020304" pitchFamily="18" charset="0"/>
                 <a:cs typeface="Times New Roman" panose="02020603050405020304" pitchFamily="18" charset="0"/>
               </a:rPr>
-              <a:t>19</a:t>
+              <a:t>18</a:t>
             </a:r>
             <a:endParaRPr lang="vi-VN" dirty="0">
               <a:latin typeface="Times New Roman" panose="02020603050405020304" pitchFamily="18" charset="0"/>
@@ -15284,10 +15278,10 @@
       </p:sp>
       <p:pic>
         <p:nvPicPr>
-          <p:cNvPr id="6" name="Picture 5">
+          <p:cNvPr id="9" name="Picture 8">
             <a:extLst>
               <a:ext uri="{FF2B5EF4-FFF2-40B4-BE49-F238E27FC236}">
-                <a16:creationId xmlns:a16="http://schemas.microsoft.com/office/drawing/2014/main" id="{F68BD703-6FD0-48C8-831A-2EBA55D33B9B}"/>
+                <a16:creationId xmlns:a16="http://schemas.microsoft.com/office/drawing/2014/main" id="{2204D8AC-339E-481D-A103-439CE7E93C36}"/>
               </a:ext>
             </a:extLst>
           </p:cNvPr>
@@ -15304,8 +15298,8 @@
         </p:blipFill>
         <p:spPr>
           <a:xfrm>
-            <a:off x="6096000" y="1527990"/>
-            <a:ext cx="4717774" cy="4762282"/>
+            <a:off x="5550993" y="1494942"/>
+            <a:ext cx="5689549" cy="4909124"/>
           </a:xfrm>
           <a:prstGeom prst="rect">
             <a:avLst/>
@@ -15365,7 +15359,7 @@
           <a:p>
             <a:r>
               <a:rPr lang="en-US">
-                <a:latin typeface="Times New Roman" panose="02020603050405020304" pitchFamily="18" charset="0"/>
+                <a:latin typeface="+mn-lt"/>
                 <a:cs typeface="Times New Roman" panose="02020603050405020304" pitchFamily="18" charset="0"/>
               </a:rPr>
               <a:t>3. Mô hình và kết quả thu được</a:t>
@@ -16009,11 +16003,11 @@
               <a:buNone/>
             </a:pPr>
             <a:r>
-              <a:rPr lang="en-US" dirty="0">
+              <a:rPr lang="en-US">
                 <a:latin typeface="Times New Roman" panose="02020603050405020304" pitchFamily="18" charset="0"/>
                 <a:cs typeface="Times New Roman" panose="02020603050405020304" pitchFamily="18" charset="0"/>
               </a:rPr>
-              <a:t>24</a:t>
+              <a:t>19</a:t>
             </a:r>
             <a:endParaRPr lang="vi-VN" dirty="0">
               <a:latin typeface="Times New Roman" panose="02020603050405020304" pitchFamily="18" charset="0"/>
@@ -16075,7 +16069,7 @@
           <a:p>
             <a:r>
               <a:rPr lang="en-US">
-                <a:latin typeface="Times New Roman" panose="02020603050405020304" pitchFamily="18" charset="0"/>
+                <a:latin typeface="+mn-lt"/>
                 <a:cs typeface="Times New Roman" panose="02020603050405020304" pitchFamily="18" charset="0"/>
               </a:rPr>
               <a:t>3. Mô hình và kết quả thu được</a:t>
@@ -16109,7 +16103,7 @@
             </a:pPr>
             <a:r>
               <a:rPr lang="en-US">
-                <a:latin typeface="Times New Roman" panose="02020603050405020304" pitchFamily="18" charset="0"/>
+                <a:latin typeface="+mn-lt"/>
                 <a:cs typeface="Times New Roman" panose="02020603050405020304" pitchFamily="18" charset="0"/>
               </a:rPr>
               <a:t>Giao diện ứng dụng điều khiển</a:t>
@@ -16384,11 +16378,11 @@
               <a:buNone/>
             </a:pPr>
             <a:r>
-              <a:rPr lang="en-US" dirty="0">
+              <a:rPr lang="en-US">
                 <a:latin typeface="Times New Roman" panose="02020603050405020304" pitchFamily="18" charset="0"/>
                 <a:cs typeface="Times New Roman" panose="02020603050405020304" pitchFamily="18" charset="0"/>
               </a:rPr>
-              <a:t>25</a:t>
+              <a:t>20</a:t>
             </a:r>
             <a:endParaRPr lang="vi-VN" dirty="0">
               <a:latin typeface="Times New Roman" panose="02020603050405020304" pitchFamily="18" charset="0"/>
@@ -20834,11 +20828,11 @@
               <a:buNone/>
             </a:pPr>
             <a:r>
-              <a:rPr lang="en-US" dirty="0">
+              <a:rPr lang="en-US">
                 <a:latin typeface="Times New Roman" panose="02020603050405020304" pitchFamily="18" charset="0"/>
                 <a:cs typeface="Times New Roman" panose="02020603050405020304" pitchFamily="18" charset="0"/>
               </a:rPr>
-              <a:t>26</a:t>
+              <a:t>21</a:t>
             </a:r>
             <a:endParaRPr lang="vi-VN" dirty="0">
               <a:latin typeface="Times New Roman" panose="02020603050405020304" pitchFamily="18" charset="0"/>
@@ -22015,11 +22009,11 @@
               <a:buNone/>
             </a:pPr>
             <a:r>
-              <a:rPr lang="en-US" dirty="0">
+              <a:rPr lang="en-US">
                 <a:latin typeface="Times New Roman" panose="02020603050405020304" pitchFamily="18" charset="0"/>
                 <a:cs typeface="Times New Roman" panose="02020603050405020304" pitchFamily="18" charset="0"/>
               </a:rPr>
-              <a:t>27</a:t>
+              <a:t>22</a:t>
             </a:r>
             <a:endParaRPr lang="vi-VN" dirty="0">
               <a:latin typeface="Times New Roman" panose="02020603050405020304" pitchFamily="18" charset="0"/>
@@ -25835,11 +25829,11 @@
               <a:buNone/>
             </a:pPr>
             <a:r>
-              <a:rPr lang="en-US" dirty="0">
+              <a:rPr lang="en-US">
                 <a:latin typeface="Times New Roman" panose="02020603050405020304" pitchFamily="18" charset="0"/>
                 <a:cs typeface="Times New Roman" panose="02020603050405020304" pitchFamily="18" charset="0"/>
               </a:rPr>
-              <a:t>6</a:t>
+              <a:t>3</a:t>
             </a:r>
             <a:endParaRPr lang="vi-VN" dirty="0">
               <a:latin typeface="Times New Roman" panose="02020603050405020304" pitchFamily="18" charset="0"/>
@@ -26480,11 +26474,11 @@
               <a:buNone/>
             </a:pPr>
             <a:r>
-              <a:rPr lang="en-US" dirty="0">
+              <a:rPr lang="en-US">
                 <a:latin typeface="Times New Roman" panose="02020603050405020304" pitchFamily="18" charset="0"/>
                 <a:cs typeface="Times New Roman" panose="02020603050405020304" pitchFamily="18" charset="0"/>
               </a:rPr>
-              <a:t>3</a:t>
+              <a:t>4</a:t>
             </a:r>
             <a:endParaRPr lang="vi-VN" dirty="0">
               <a:latin typeface="Times New Roman" panose="02020603050405020304" pitchFamily="18" charset="0"/>
@@ -26969,11 +26963,11 @@
               <a:buNone/>
             </a:pPr>
             <a:r>
-              <a:rPr lang="en-US" dirty="0">
+              <a:rPr lang="en-US">
                 <a:latin typeface="Times New Roman" panose="02020603050405020304" pitchFamily="18" charset="0"/>
                 <a:cs typeface="Times New Roman" panose="02020603050405020304" pitchFamily="18" charset="0"/>
               </a:rPr>
-              <a:t>4</a:t>
+              <a:t>5</a:t>
             </a:r>
             <a:endParaRPr lang="vi-VN" dirty="0">
               <a:latin typeface="Times New Roman" panose="02020603050405020304" pitchFamily="18" charset="0"/>
@@ -28182,6 +28176,12 @@
 </file>
 
 <file path=customXml/item1.xml><?xml version="1.0" encoding="utf-8"?>
+<p:properties xmlns:p="http://schemas.microsoft.com/office/2006/metadata/properties" xmlns:xsi="http://www.w3.org/2001/XMLSchema-instance" xmlns:pc="http://schemas.microsoft.com/office/infopath/2007/PartnerControls">
+  <documentManagement/>
+</p:properties>
+</file>
+
+<file path=customXml/item2.xml><?xml version="1.0" encoding="utf-8"?>
 <ct:contentTypeSchema xmlns:ct="http://schemas.microsoft.com/office/2006/metadata/contentType" xmlns:ma="http://schemas.microsoft.com/office/2006/metadata/properties/metaAttributes" ct:_="" ma:_="" ma:contentTypeName="Document" ma:contentTypeID="0x01010029FB87B201BB164AA8F0D7E07FC18253" ma:contentTypeVersion="12" ma:contentTypeDescription="Create a new document." ma:contentTypeScope="" ma:versionID="ec75d641dd128f4ad30853614c3b4998">
   <xsd:schema xmlns:xsd="http://www.w3.org/2001/XMLSchema" xmlns:xs="http://www.w3.org/2001/XMLSchema" xmlns:p="http://schemas.microsoft.com/office/2006/metadata/properties" xmlns:ns2="c070d92c-e005-4177-a1a8-b2208be38bba" xmlns:ns3="c72df4cc-d2de-4b7e-8388-06b9b73bb217" targetNamespace="http://schemas.microsoft.com/office/2006/metadata/properties" ma:root="true" ma:fieldsID="0bd5079f3866d8fa0d2cfeac6b7a2082" ns2:_="" ns3:_="">
     <xsd:import namespace="c070d92c-e005-4177-a1a8-b2208be38bba"/>
@@ -28398,12 +28398,6 @@
 </ct:contentTypeSchema>
 </file>
 
-<file path=customXml/item2.xml><?xml version="1.0" encoding="utf-8"?>
-<p:properties xmlns:p="http://schemas.microsoft.com/office/2006/metadata/properties" xmlns:xsi="http://www.w3.org/2001/XMLSchema-instance" xmlns:pc="http://schemas.microsoft.com/office/infopath/2007/PartnerControls">
-  <documentManagement/>
-</p:properties>
-</file>
-
 <file path=customXml/item3.xml><?xml version="1.0" encoding="utf-8"?>
 <?mso-contentType ?>
 <FormTemplates xmlns="http://schemas.microsoft.com/sharepoint/v3/contenttype/forms">
@@ -28414,6 +28408,15 @@
 </file>
 
 <file path=customXml/itemProps1.xml><?xml version="1.0" encoding="utf-8"?>
+<ds:datastoreItem xmlns:ds="http://schemas.openxmlformats.org/officeDocument/2006/customXml" ds:itemID="{5666771F-238C-409E-B1DF-70481BFDE8AE}">
+  <ds:schemaRefs>
+    <ds:schemaRef ds:uri="http://schemas.microsoft.com/office/2006/metadata/properties"/>
+    <ds:schemaRef ds:uri="http://schemas.microsoft.com/office/infopath/2007/PartnerControls"/>
+  </ds:schemaRefs>
+</ds:datastoreItem>
+</file>
+
+<file path=customXml/itemProps2.xml><?xml version="1.0" encoding="utf-8"?>
 <ds:datastoreItem xmlns:ds="http://schemas.openxmlformats.org/officeDocument/2006/customXml" ds:itemID="{D2294227-C537-4C56-90F1-0A24B92707E6}">
   <ds:schemaRefs>
     <ds:schemaRef ds:uri="http://schemas.microsoft.com/office/2006/metadata/contentType"/>
@@ -28432,15 +28435,6 @@
 </ds:datastoreItem>
 </file>
 
-<file path=customXml/itemProps2.xml><?xml version="1.0" encoding="utf-8"?>
-<ds:datastoreItem xmlns:ds="http://schemas.openxmlformats.org/officeDocument/2006/customXml" ds:itemID="{5666771F-238C-409E-B1DF-70481BFDE8AE}">
-  <ds:schemaRefs>
-    <ds:schemaRef ds:uri="http://schemas.microsoft.com/office/2006/metadata/properties"/>
-    <ds:schemaRef ds:uri="http://schemas.microsoft.com/office/infopath/2007/PartnerControls"/>
-  </ds:schemaRefs>
-</ds:datastoreItem>
-</file>
-
 <file path=customXml/itemProps3.xml><?xml version="1.0" encoding="utf-8"?>
 <ds:datastoreItem xmlns:ds="http://schemas.openxmlformats.org/officeDocument/2006/customXml" ds:itemID="{69128D4C-6F8B-42B2-A3A4-DC1405FCC7A7}">
   <ds:schemaRefs>

</xml_diff>